<commit_message>
modified:   README.org 	modified:   qiita_org.pptx 	new file:   qiita_org/slide_1.png 	new file:   "../\343\202\271\343\203\251\343\202\244\343\203\2111.png"
</commit_message>
<xml_diff>
--- a/docs/qiita_org.pptx
+++ b/docs/qiita_org.pptx
@@ -104,6 +104,11 @@
       </a:defRPr>
     </a:lvl9pPr>
   </p:defaultTextStyle>
+  <p:extLst>
+    <p:ext uri="{EFAFB233-063F-42B5-8137-9DF3F51BA10A}">
+      <p15:sldGuideLst xmlns:p15="http://schemas.microsoft.com/office/powerpoint/2012/main"/>
+    </p:ext>
+  </p:extLst>
 </p:presentation>
 </file>
 
@@ -254,7 +259,7 @@
           <a:p>
             <a:fld id="{7C6B9F09-FC30-404E-9742-E1E6CE0FAEC9}" type="datetimeFigureOut">
               <a:rPr kumimoji="1" lang="ja-JP" altLang="en-US" smtClean="0"/>
-              <a:t>2021/6/22</a:t>
+              <a:t>2021/6/23</a:t>
             </a:fld>
             <a:endParaRPr kumimoji="1" lang="ja-JP" altLang="en-US"/>
           </a:p>
@@ -484,7 +489,7 @@
           <a:p>
             <a:fld id="{7C6B9F09-FC30-404E-9742-E1E6CE0FAEC9}" type="datetimeFigureOut">
               <a:rPr kumimoji="1" lang="ja-JP" altLang="en-US" smtClean="0"/>
-              <a:t>2021/6/22</a:t>
+              <a:t>2021/6/23</a:t>
             </a:fld>
             <a:endParaRPr kumimoji="1" lang="ja-JP" altLang="en-US"/>
           </a:p>
@@ -724,7 +729,7 @@
           <a:p>
             <a:fld id="{7C6B9F09-FC30-404E-9742-E1E6CE0FAEC9}" type="datetimeFigureOut">
               <a:rPr kumimoji="1" lang="ja-JP" altLang="en-US" smtClean="0"/>
-              <a:t>2021/6/22</a:t>
+              <a:t>2021/6/23</a:t>
             </a:fld>
             <a:endParaRPr kumimoji="1" lang="ja-JP" altLang="en-US"/>
           </a:p>
@@ -954,7 +959,7 @@
           <a:p>
             <a:fld id="{7C6B9F09-FC30-404E-9742-E1E6CE0FAEC9}" type="datetimeFigureOut">
               <a:rPr kumimoji="1" lang="ja-JP" altLang="en-US" smtClean="0"/>
-              <a:t>2021/6/22</a:t>
+              <a:t>2021/6/23</a:t>
             </a:fld>
             <a:endParaRPr kumimoji="1" lang="ja-JP" altLang="en-US"/>
           </a:p>
@@ -1229,7 +1234,7 @@
           <a:p>
             <a:fld id="{7C6B9F09-FC30-404E-9742-E1E6CE0FAEC9}" type="datetimeFigureOut">
               <a:rPr kumimoji="1" lang="ja-JP" altLang="en-US" smtClean="0"/>
-              <a:t>2021/6/22</a:t>
+              <a:t>2021/6/23</a:t>
             </a:fld>
             <a:endParaRPr kumimoji="1" lang="ja-JP" altLang="en-US"/>
           </a:p>
@@ -1558,7 +1563,7 @@
           <a:p>
             <a:fld id="{7C6B9F09-FC30-404E-9742-E1E6CE0FAEC9}" type="datetimeFigureOut">
               <a:rPr kumimoji="1" lang="ja-JP" altLang="en-US" smtClean="0"/>
-              <a:t>2021/6/22</a:t>
+              <a:t>2021/6/23</a:t>
             </a:fld>
             <a:endParaRPr kumimoji="1" lang="ja-JP" altLang="en-US"/>
           </a:p>
@@ -2034,7 +2039,7 @@
           <a:p>
             <a:fld id="{7C6B9F09-FC30-404E-9742-E1E6CE0FAEC9}" type="datetimeFigureOut">
               <a:rPr kumimoji="1" lang="ja-JP" altLang="en-US" smtClean="0"/>
-              <a:t>2021/6/22</a:t>
+              <a:t>2021/6/23</a:t>
             </a:fld>
             <a:endParaRPr kumimoji="1" lang="ja-JP" altLang="en-US"/>
           </a:p>
@@ -2175,7 +2180,7 @@
           <a:p>
             <a:fld id="{7C6B9F09-FC30-404E-9742-E1E6CE0FAEC9}" type="datetimeFigureOut">
               <a:rPr kumimoji="1" lang="ja-JP" altLang="en-US" smtClean="0"/>
-              <a:t>2021/6/22</a:t>
+              <a:t>2021/6/23</a:t>
             </a:fld>
             <a:endParaRPr kumimoji="1" lang="ja-JP" altLang="en-US"/>
           </a:p>
@@ -2288,7 +2293,7 @@
           <a:p>
             <a:fld id="{7C6B9F09-FC30-404E-9742-E1E6CE0FAEC9}" type="datetimeFigureOut">
               <a:rPr kumimoji="1" lang="ja-JP" altLang="en-US" smtClean="0"/>
-              <a:t>2021/6/22</a:t>
+              <a:t>2021/6/23</a:t>
             </a:fld>
             <a:endParaRPr kumimoji="1" lang="ja-JP" altLang="en-US"/>
           </a:p>
@@ -2631,7 +2636,7 @@
           <a:p>
             <a:fld id="{7C6B9F09-FC30-404E-9742-E1E6CE0FAEC9}" type="datetimeFigureOut">
               <a:rPr kumimoji="1" lang="ja-JP" altLang="en-US" smtClean="0"/>
-              <a:t>2021/6/22</a:t>
+              <a:t>2021/6/23</a:t>
             </a:fld>
             <a:endParaRPr kumimoji="1" lang="ja-JP" altLang="en-US"/>
           </a:p>
@@ -2919,7 +2924,7 @@
           <a:p>
             <a:fld id="{7C6B9F09-FC30-404E-9742-E1E6CE0FAEC9}" type="datetimeFigureOut">
               <a:rPr kumimoji="1" lang="ja-JP" altLang="en-US" smtClean="0"/>
-              <a:t>2021/6/22</a:t>
+              <a:t>2021/6/23</a:t>
             </a:fld>
             <a:endParaRPr kumimoji="1" lang="ja-JP" altLang="en-US"/>
           </a:p>
@@ -3192,7 +3197,7 @@
           <a:p>
             <a:fld id="{7C6B9F09-FC30-404E-9742-E1E6CE0FAEC9}" type="datetimeFigureOut">
               <a:rPr kumimoji="1" lang="ja-JP" altLang="en-US" smtClean="0"/>
-              <a:t>2021/6/22</a:t>
+              <a:t>2021/6/23</a:t>
             </a:fld>
             <a:endParaRPr kumimoji="1" lang="ja-JP" altLang="en-US"/>
           </a:p>
@@ -3630,10 +3635,6 @@
           <a:bodyPr/>
           <a:lstStyle/>
           <a:p>
-            <a:r>
-              <a:rPr kumimoji="1" lang="en-US" altLang="ja-JP"/>
-              <a:t>aaA</a:t>
-            </a:r>
             <a:br>
               <a:rPr kumimoji="1" lang="en-US" altLang="ja-JP" dirty="0"/>
             </a:br>
@@ -3666,6 +3667,36 @@
           </a:p>
         </p:txBody>
       </p:sp>
+      <p:pic>
+        <p:nvPicPr>
+          <p:cNvPr id="6" name="図 5" descr="タイムライン が含まれている画像&#10;&#10;自動的に生成された説明">
+            <a:extLst>
+              <a:ext uri="{FF2B5EF4-FFF2-40B4-BE49-F238E27FC236}">
+                <a16:creationId xmlns:a16="http://schemas.microsoft.com/office/drawing/2014/main" id="{9E8A87ED-3745-794E-A089-465EADC4E5E2}"/>
+              </a:ext>
+            </a:extLst>
+          </p:cNvPr>
+          <p:cNvPicPr>
+            <a:picLocks noChangeAspect="1"/>
+          </p:cNvPicPr>
+          <p:nvPr/>
+        </p:nvPicPr>
+        <p:blipFill>
+          <a:blip r:embed="rId2"/>
+          <a:stretch>
+            <a:fillRect/>
+          </a:stretch>
+        </p:blipFill>
+        <p:spPr>
+          <a:xfrm>
+            <a:off x="609600" y="182880"/>
+            <a:ext cx="10972800" cy="6492240"/>
+          </a:xfrm>
+          <a:prstGeom prst="rect">
+            <a:avLst/>
+          </a:prstGeom>
+        </p:spPr>
+      </p:pic>
     </p:spTree>
     <p:extLst>
       <p:ext uri="{BB962C8B-B14F-4D97-AF65-F5344CB8AC3E}">

</xml_diff>